<commit_message>
20200313{Starting The Api Gateways}
</commit_message>
<xml_diff>
--- a/Versions/Cover.pptx
+++ b/Versions/Cover.pptx
@@ -4181,7 +4181,7 @@
           <a:p>
             <a:fld id="{7258B7A7-5AE5-4EE3-808F-A566F96DB4B7}" type="datetimeFigureOut">
               <a:rPr lang="en-US" smtClean="0"/>
-              <a:t>12/8/2019</a:t>
+              <a:t>2/17/2020</a:t>
             </a:fld>
             <a:endParaRPr lang="en-US"/>
           </a:p>
@@ -4351,7 +4351,7 @@
           <a:p>
             <a:fld id="{7258B7A7-5AE5-4EE3-808F-A566F96DB4B7}" type="datetimeFigureOut">
               <a:rPr lang="en-US" smtClean="0"/>
-              <a:t>12/8/2019</a:t>
+              <a:t>2/17/2020</a:t>
             </a:fld>
             <a:endParaRPr lang="en-US"/>
           </a:p>
@@ -4531,7 +4531,7 @@
           <a:p>
             <a:fld id="{7258B7A7-5AE5-4EE3-808F-A566F96DB4B7}" type="datetimeFigureOut">
               <a:rPr lang="en-US" smtClean="0"/>
-              <a:t>12/8/2019</a:t>
+              <a:t>2/17/2020</a:t>
             </a:fld>
             <a:endParaRPr lang="en-US"/>
           </a:p>
@@ -4701,7 +4701,7 @@
           <a:p>
             <a:fld id="{7258B7A7-5AE5-4EE3-808F-A566F96DB4B7}" type="datetimeFigureOut">
               <a:rPr lang="en-US" smtClean="0"/>
-              <a:t>12/8/2019</a:t>
+              <a:t>2/17/2020</a:t>
             </a:fld>
             <a:endParaRPr lang="en-US"/>
           </a:p>
@@ -4945,7 +4945,7 @@
           <a:p>
             <a:fld id="{7258B7A7-5AE5-4EE3-808F-A566F96DB4B7}" type="datetimeFigureOut">
               <a:rPr lang="en-US" smtClean="0"/>
-              <a:t>12/8/2019</a:t>
+              <a:t>2/17/2020</a:t>
             </a:fld>
             <a:endParaRPr lang="en-US"/>
           </a:p>
@@ -5177,7 +5177,7 @@
           <a:p>
             <a:fld id="{7258B7A7-5AE5-4EE3-808F-A566F96DB4B7}" type="datetimeFigureOut">
               <a:rPr lang="en-US" smtClean="0"/>
-              <a:t>12/8/2019</a:t>
+              <a:t>2/17/2020</a:t>
             </a:fld>
             <a:endParaRPr lang="en-US"/>
           </a:p>
@@ -5544,7 +5544,7 @@
           <a:p>
             <a:fld id="{7258B7A7-5AE5-4EE3-808F-A566F96DB4B7}" type="datetimeFigureOut">
               <a:rPr lang="en-US" smtClean="0"/>
-              <a:t>12/8/2019</a:t>
+              <a:t>2/17/2020</a:t>
             </a:fld>
             <a:endParaRPr lang="en-US"/>
           </a:p>
@@ -5662,7 +5662,7 @@
           <a:p>
             <a:fld id="{7258B7A7-5AE5-4EE3-808F-A566F96DB4B7}" type="datetimeFigureOut">
               <a:rPr lang="en-US" smtClean="0"/>
-              <a:t>12/8/2019</a:t>
+              <a:t>2/17/2020</a:t>
             </a:fld>
             <a:endParaRPr lang="en-US"/>
           </a:p>
@@ -5757,7 +5757,7 @@
           <a:p>
             <a:fld id="{7258B7A7-5AE5-4EE3-808F-A566F96DB4B7}" type="datetimeFigureOut">
               <a:rPr lang="en-US" smtClean="0"/>
-              <a:t>12/8/2019</a:t>
+              <a:t>2/17/2020</a:t>
             </a:fld>
             <a:endParaRPr lang="en-US"/>
           </a:p>
@@ -6034,7 +6034,7 @@
           <a:p>
             <a:fld id="{7258B7A7-5AE5-4EE3-808F-A566F96DB4B7}" type="datetimeFigureOut">
               <a:rPr lang="en-US" smtClean="0"/>
-              <a:t>12/8/2019</a:t>
+              <a:t>2/17/2020</a:t>
             </a:fld>
             <a:endParaRPr lang="en-US"/>
           </a:p>
@@ -6291,7 +6291,7 @@
           <a:p>
             <a:fld id="{7258B7A7-5AE5-4EE3-808F-A566F96DB4B7}" type="datetimeFigureOut">
               <a:rPr lang="en-US" smtClean="0"/>
-              <a:t>12/8/2019</a:t>
+              <a:t>2/17/2020</a:t>
             </a:fld>
             <a:endParaRPr lang="en-US"/>
           </a:p>
@@ -6504,7 +6504,7 @@
           <a:p>
             <a:fld id="{7258B7A7-5AE5-4EE3-808F-A566F96DB4B7}" type="datetimeFigureOut">
               <a:rPr lang="en-US" smtClean="0"/>
-              <a:t>12/8/2019</a:t>
+              <a:t>2/17/2020</a:t>
             </a:fld>
             <a:endParaRPr lang="en-US"/>
           </a:p>
@@ -7084,8 +7084,8 @@
         </p:nvSpPr>
         <p:spPr>
           <a:xfrm>
-            <a:off x="-150235" y="6837830"/>
-            <a:ext cx="7158470" cy="400110"/>
+            <a:off x="-1" y="6837830"/>
+            <a:ext cx="6858001" cy="400110"/>
           </a:xfrm>
           <a:prstGeom prst="rect">
             <a:avLst/>
@@ -7307,7 +7307,7 @@
         </p:nvSpPr>
         <p:spPr>
           <a:xfrm>
-            <a:off x="4489530" y="7871407"/>
+            <a:off x="4300428" y="8535651"/>
             <a:ext cx="2026196" cy="523220"/>
           </a:xfrm>
           <a:prstGeom prst="rect">
@@ -7362,7 +7362,7 @@
         </p:nvSpPr>
         <p:spPr>
           <a:xfrm>
-            <a:off x="4114941" y="8394627"/>
+            <a:off x="3941997" y="9028094"/>
             <a:ext cx="2743059" cy="400110"/>
           </a:xfrm>
           <a:prstGeom prst="rect">
@@ -7461,7 +7461,7 @@
         <p:spPr>
           <a:xfrm>
             <a:off x="5876364" y="0"/>
-            <a:ext cx="1963271" cy="2312894"/>
+            <a:ext cx="1963271" cy="3878126"/>
           </a:xfrm>
           <a:prstGeom prst="flowChartMerge">
             <a:avLst/>
@@ -7471,6 +7471,9 @@
               <a:lumMod val="25000"/>
             </a:schemeClr>
           </a:solidFill>
+          <a:ln>
+            <a:noFill/>
+          </a:ln>
         </p:spPr>
         <p:style>
           <a:lnRef idx="2">
@@ -7494,6 +7497,66 @@
           <a:p>
             <a:pPr algn="ctr"/>
             <a:endParaRPr lang="en-US" dirty="0"/>
+          </a:p>
+        </p:txBody>
+      </p:sp>
+      <p:sp>
+        <p:nvSpPr>
+          <p:cNvPr id="5" name="Rectangle 4">
+            <a:extLst>
+              <a:ext uri="{FF2B5EF4-FFF2-40B4-BE49-F238E27FC236}">
+                <a16:creationId xmlns:a16="http://schemas.microsoft.com/office/drawing/2014/main" id="{9402F6B5-8357-41A1-9634-15BDB3ED4B2F}"/>
+              </a:ext>
+            </a:extLst>
+          </p:cNvPr>
+          <p:cNvSpPr/>
+          <p:nvPr/>
+        </p:nvSpPr>
+        <p:spPr>
+          <a:xfrm rot="2636136">
+            <a:off x="-564701" y="8858815"/>
+            <a:ext cx="2823882" cy="400110"/>
+          </a:xfrm>
+          <a:prstGeom prst="rect">
+            <a:avLst/>
+          </a:prstGeom>
+          <a:ln w="76200">
+            <a:solidFill>
+              <a:schemeClr val="accent5">
+                <a:lumMod val="75000"/>
+              </a:schemeClr>
+            </a:solidFill>
+          </a:ln>
+        </p:spPr>
+        <p:style>
+          <a:lnRef idx="2">
+            <a:schemeClr val="accent4">
+              <a:shade val="50000"/>
+            </a:schemeClr>
+          </a:lnRef>
+          <a:fillRef idx="1">
+            <a:schemeClr val="accent4"/>
+          </a:fillRef>
+          <a:effectRef idx="0">
+            <a:schemeClr val="accent4"/>
+          </a:effectRef>
+          <a:fontRef idx="minor">
+            <a:schemeClr val="lt1"/>
+          </a:fontRef>
+        </p:style>
+        <p:txBody>
+          <a:bodyPr rtlCol="0" anchor="ctr"/>
+          <a:lstStyle/>
+          <a:p>
+            <a:pPr algn="ctr"/>
+            <a:r>
+              <a:rPr lang="en-US" sz="2400" b="1" dirty="0" err="1"/>
+              <a:t>.Net</a:t>
+            </a:r>
+            <a:r>
+              <a:rPr lang="en-US" sz="2400" b="1" dirty="0"/>
+              <a:t> Core 3.1</a:t>
+            </a:r>
           </a:p>
         </p:txBody>
       </p:sp>

</xml_diff>